<commit_message>
sistemata presentazione, dagli una lettura
</commit_message>
<xml_diff>
--- a/Presentazioni/Presentazione_soar.pptx
+++ b/Presentazioni/Presentazione_soar.pptx
@@ -3463,7 +3463,7 @@
         <p:spPr>
           <a:xfrm>
             <a:off x="343269" y="479394"/>
-            <a:ext cx="11505461" cy="6186309"/>
+            <a:ext cx="11505461" cy="6555641"/>
           </a:xfrm>
           <a:prstGeom prst="rect">
             <a:avLst/>
@@ -3478,15 +3478,15 @@
           <a:p>
             <a:r>
               <a:rPr lang="it-IT" sz="2400" dirty="0"/>
-              <a:t>Il progetto per la terza parte richiedeva di sviluppare un in </a:t>
+              <a:t>Il progetto per la terza parte richiedeva di sviluppare, con un programma in </a:t>
             </a:r>
             <a:r>
               <a:rPr lang="it-IT" sz="2400" dirty="0" err="1"/>
-              <a:t>soar</a:t>
+              <a:t>Soar</a:t>
             </a:r>
             <a:r>
               <a:rPr lang="it-IT" sz="2400" dirty="0"/>
-              <a:t> un agente intelligente in grado di evadere da una stanza utilizzando gli oggetti al suo interno. Nello specifico ha a disposizione:</a:t>
+              <a:t>, un agente intelligente in grado di evadere da una stanza utilizzando gli oggetti al suo interno. Nello specifico ha a disposizione:</a:t>
             </a:r>
           </a:p>
           <a:p>
@@ -3542,7 +3542,7 @@
           <a:p>
             <a:r>
               <a:rPr lang="it-IT" sz="2400" dirty="0"/>
-              <a:t>L’obbiettivo dell’agente è quello di rompere una finestra blindata sensibile in determinati punti per poi fuggire attraverso di essa.</a:t>
+              <a:t>L’obbiettivo dell’agente è quello di rompere una finestra blindata sensibile in 2 punti distinti, utilizzando uno strumento creato con gli oggetti a sua disposizione, per poi fuggire attraverso di essa.</a:t>
             </a:r>
           </a:p>
           <a:p>
@@ -3664,7 +3664,7 @@
             </a:r>
             <a:r>
               <a:rPr lang="it-IT" dirty="0"/>
-              <a:t> a ogni strumento. </a:t>
+              <a:t> a ogni strumento costruito. </a:t>
             </a:r>
           </a:p>
           <a:p>
@@ -3755,7 +3755,7 @@
         <p:spPr>
           <a:xfrm>
             <a:off x="292963" y="185590"/>
-            <a:ext cx="5803037" cy="3970318"/>
+            <a:ext cx="5803037" cy="4247317"/>
           </a:xfrm>
           <a:prstGeom prst="rect">
             <a:avLst/>
@@ -3825,7 +3825,7 @@
             </a:r>
             <a:r>
               <a:rPr lang="it-IT" dirty="0"/>
-              <a:t> e in base agli oggetti raccolti dall’agente otterrò uno strumento</a:t>
+              <a:t> e in base agli oggetti raccolti dall’agente verrà costruito uno strumento</a:t>
             </a:r>
           </a:p>
         </p:txBody>
@@ -3981,7 +3981,7 @@
             <a:pPr algn="just"/>
             <a:r>
               <a:rPr lang="it-IT" dirty="0"/>
-              <a:t>Questo garantisce che durante la prima esecuzione del programma l’agente può scegliere liberamente uno dei tre strumenti senza nessun tipo di influenza esterna.</a:t>
+              <a:t>Questo garantisce che durante la prima esecuzione del programma l’agente può scegliere liberamente uno dei tre strumenti senza nessun tipo di influenza.</a:t>
             </a:r>
           </a:p>
           <a:p>
@@ -3992,7 +3992,7 @@
             <a:pPr algn="just"/>
             <a:r>
               <a:rPr lang="it-IT" dirty="0"/>
-              <a:t>Solo dopo aver effettivamente costruito uno strumento l’agente riceverà un rinforzo positivo o negativo in base alle strumento che possiede.</a:t>
+              <a:t>Solo dopo aver effettivamente costruito uno strumento l’agente riceverà un rinforzo positivo o negativo in base allo strumento che possiede.</a:t>
             </a:r>
           </a:p>
         </p:txBody>
@@ -4137,7 +4137,7 @@
             <a:pPr algn="just"/>
             <a:r>
               <a:rPr lang="it-IT" dirty="0"/>
-              <a:t>Non tutti gli strumenti possono effettivamente rompere la finestra e in questo caso può farlo solo la fionda.</a:t>
+              <a:t>Non tutti gli strumenti possono effettivamente rompere la finestra. In questo caso può farlo solo la fionda.</a:t>
             </a:r>
           </a:p>
           <a:p>
@@ -4285,7 +4285,7 @@
             <a:pPr algn="just"/>
             <a:r>
               <a:rPr lang="it-IT" dirty="0"/>
-              <a:t>Eseguendo distruggi finestra l’agente riutilizza la fionda, colpendo il vetro una seconda volta frantumandolo e l’agente passa nello stato finestra rotta e inizia la fase di fuga.</a:t>
+              <a:t>Eseguendo distruggi finestra l’agente riutilizza la fionda, colpendo il vetro una seconda volta frantumandolo e l’agente passa nello stato finestra rotta iniziando la fase di fuga.</a:t>
             </a:r>
           </a:p>
           <a:p>
@@ -4384,7 +4384,7 @@
             <a:pPr algn="just"/>
             <a:r>
               <a:rPr lang="it-IT" dirty="0"/>
-              <a:t>Per fuggire all’agente serve una scala con cui raggiungere la finestra e finalmente uscire dalla stanza.</a:t>
+              <a:t>Per fuggire all’agente servirà una scala con cui raggiungere la finestra e finalmente uscire dalla stanza.</a:t>
             </a:r>
           </a:p>
           <a:p>
@@ -4430,7 +4430,7 @@
             </a:r>
             <a:r>
               <a:rPr lang="it-IT" dirty="0"/>
-              <a:t> servono per poter creare a partire dai tronchi disponibili una scala.</a:t>
+              <a:t> servono per poter creare, a partire dai tronchi disponibili, una scala.</a:t>
             </a:r>
           </a:p>
           <a:p>
@@ -4441,7 +4441,7 @@
             <a:pPr algn="just"/>
             <a:r>
               <a:rPr lang="it-IT" dirty="0"/>
-              <a:t>Dopo la creazione della scala l’agente si trova nello stato </a:t>
+              <a:t>Dopo la creazione della scala l’agente non avrà più tronchi a disposizione, trovandosi nello stato </a:t>
             </a:r>
             <a:r>
               <a:rPr lang="it-IT" dirty="0" err="1"/>
@@ -4449,7 +4449,7 @@
             </a:r>
             <a:r>
               <a:rPr lang="it-IT" dirty="0"/>
-              <a:t>, ha 0 tronchi a disposizione e possiede la scala</a:t>
+              <a:t>.</a:t>
             </a:r>
           </a:p>
         </p:txBody>
@@ -4567,15 +4567,7 @@
             <a:pPr algn="just"/>
             <a:r>
               <a:rPr lang="it-IT" dirty="0"/>
-              <a:t>Dal momento che l’agente non si trova più nella condizione </a:t>
-            </a:r>
-            <a:r>
-              <a:rPr lang="it-IT" dirty="0" err="1"/>
-              <a:t>dentro_cella</a:t>
-            </a:r>
-            <a:r>
-              <a:rPr lang="it-IT" dirty="0"/>
-              <a:t> può salire le scale e fuggire dalla stanza raggiungendo il suo obbiettivo.</a:t>
+              <a:t>Ora l’agente è libero.</a:t>
             </a:r>
           </a:p>
           <a:p>
@@ -4597,7 +4589,7 @@
             <a:pPr algn="just"/>
             <a:r>
               <a:rPr lang="it-IT" dirty="0"/>
-              <a:t>Abbiamo fatto delle prove per vedere se effettivamente il </a:t>
+              <a:t>Abbiamo fatto delle prove per vedere se effettivamente le </a:t>
             </a:r>
             <a:r>
               <a:rPr lang="it-IT" dirty="0" err="1"/>
@@ -4605,7 +4597,7 @@
             </a:r>
             <a:r>
               <a:rPr lang="it-IT" dirty="0"/>
-              <a:t> venisse assegnato correttamente e per mezzo del comando </a:t>
+              <a:t> venissero assegnate correttamente e per mezzo del comando </a:t>
             </a:r>
             <a:r>
               <a:rPr lang="it-IT" dirty="0" err="1"/>
@@ -4621,7 +4613,38 @@
             </a:r>
             <a:r>
               <a:rPr lang="it-IT" dirty="0"/>
-              <a:t> abbiamo potuto verificare la correttezza dell'assegnamento. L’agente inoltre all’inizio costruisce liberamente uno qualunque dei tre strumenti a disposizione andando a escludere dalla seconda esecuzione quelli non utili.</a:t>
+              <a:t> abbiamo potuto verificare la correttezza dell'assegnamento. </a:t>
+            </a:r>
+          </a:p>
+          <a:p>
+            <a:pPr algn="just"/>
+            <a:r>
+              <a:rPr lang="it-IT" dirty="0"/>
+              <a:t>L’agente proverà a costruire uno strumento, se non </a:t>
+            </a:r>
+            <a:r>
+              <a:rPr lang="it-IT"/>
+              <a:t>è una </a:t>
+            </a:r>
+            <a:r>
+              <a:rPr lang="it-IT" dirty="0"/>
+              <a:t>fionda riceverà una </a:t>
+            </a:r>
+            <a:r>
+              <a:rPr lang="it-IT" dirty="0" err="1"/>
+              <a:t>reward</a:t>
+            </a:r>
+            <a:r>
+              <a:rPr lang="it-IT" dirty="0"/>
+              <a:t> negativa portando l’agente a provare a costruirne un altro. Quando invece costruirà una fionda riceverà una </a:t>
+            </a:r>
+            <a:r>
+              <a:rPr lang="it-IT" dirty="0" err="1"/>
+              <a:t>reward</a:t>
+            </a:r>
+            <a:r>
+              <a:rPr lang="it-IT" dirty="0"/>
+              <a:t> positiva portando l’agente a costruire sempre quello strumento per fuggire da una cella.</a:t>
             </a:r>
           </a:p>
         </p:txBody>

</xml_diff>